<commit_message>
Porovnanie s predošlími generáciami
+Graf
- text
</commit_message>
<xml_diff>
--- a/5g sieť.pptx
+++ b/5g sieť.pptx
@@ -5,10 +5,10 @@
     <p:sldMasterId id="2147483672" r:id="rId1"/>
   </p:sldMasterIdLst>
   <p:notesMasterIdLst>
-    <p:notesMasterId r:id="rId11"/>
+    <p:notesMasterId r:id="rId12"/>
   </p:notesMasterIdLst>
   <p:handoutMasterIdLst>
-    <p:handoutMasterId r:id="rId12"/>
+    <p:handoutMasterId r:id="rId13"/>
   </p:handoutMasterIdLst>
   <p:sldIdLst>
     <p:sldId id="272" r:id="rId2"/>
@@ -17,9 +17,10 @@
     <p:sldId id="267" r:id="rId5"/>
     <p:sldId id="271" r:id="rId6"/>
     <p:sldId id="265" r:id="rId7"/>
-    <p:sldId id="266" r:id="rId8"/>
-    <p:sldId id="273" r:id="rId9"/>
-    <p:sldId id="274" r:id="rId10"/>
+    <p:sldId id="275" r:id="rId8"/>
+    <p:sldId id="266" r:id="rId9"/>
+    <p:sldId id="273" r:id="rId10"/>
+    <p:sldId id="274" r:id="rId11"/>
   </p:sldIdLst>
   <p:sldSz cx="12192000" cy="6858000"/>
   <p:notesSz cx="6858000" cy="9144000"/>
@@ -9592,6 +9593,412 @@
 </p:sld>
 </file>
 
+<file path=ppt/slides/slide10.xml><?xml version="1.0" encoding="utf-8"?>
+<p:sld xmlns:a="http://schemas.openxmlformats.org/drawingml/2006/main" xmlns:r="http://schemas.openxmlformats.org/officeDocument/2006/relationships" xmlns:p="http://schemas.openxmlformats.org/presentationml/2006/main">
+  <p:cSld>
+    <p:spTree>
+      <p:nvGrpSpPr>
+        <p:cNvPr id="1" name=""/>
+        <p:cNvGrpSpPr/>
+        <p:nvPr/>
+      </p:nvGrpSpPr>
+      <p:grpSpPr>
+        <a:xfrm>
+          <a:off x="0" y="0"/>
+          <a:ext cx="0" cy="0"/>
+          <a:chOff x="0" y="0"/>
+          <a:chExt cx="0" cy="0"/>
+        </a:xfrm>
+      </p:grpSpPr>
+      <p:pic>
+        <p:nvPicPr>
+          <p:cNvPr id="5122" name="Picture 2" descr="5G-Technologie: Alles, was es zu wissen gilt">
+            <a:extLst>
+              <a:ext uri="{FF2B5EF4-FFF2-40B4-BE49-F238E27FC236}">
+                <a16:creationId xmlns:a16="http://schemas.microsoft.com/office/drawing/2014/main" id="{5CAD5020-3FC7-5F2A-B8C5-FF0A6E49D881}"/>
+              </a:ext>
+            </a:extLst>
+          </p:cNvPr>
+          <p:cNvPicPr>
+            <a:picLocks noGrp="1" noRot="1" noChangeAspect="1" noMove="1" noResize="1" noEditPoints="1" noAdjustHandles="1" noChangeArrowheads="1" noChangeShapeType="1" noCrop="1"/>
+          </p:cNvPicPr>
+          <p:nvPr/>
+        </p:nvPicPr>
+        <p:blipFill rotWithShape="1">
+          <a:blip r:embed="rId2">
+            <a:extLst>
+              <a:ext uri="{28A0092B-C50C-407E-A947-70E740481C1C}">
+                <a14:useLocalDpi xmlns:a14="http://schemas.microsoft.com/office/drawing/2010/main" val="0"/>
+              </a:ext>
+            </a:extLst>
+          </a:blip>
+          <a:srcRect b="15670"/>
+          <a:stretch/>
+        </p:blipFill>
+        <p:spPr bwMode="auto">
+          <a:xfrm>
+            <a:off x="0" y="0"/>
+            <a:ext cx="12192000" cy="6858000"/>
+          </a:xfrm>
+          <a:prstGeom prst="rect">
+            <a:avLst/>
+          </a:prstGeom>
+          <a:noFill/>
+          <a:extLst>
+            <a:ext uri="{909E8E84-426E-40DD-AFC4-6F175D3DCCD1}">
+              <a14:hiddenFill xmlns:a14="http://schemas.microsoft.com/office/drawing/2010/main">
+                <a:solidFill>
+                  <a:srgbClr val="FFFFFF"/>
+                </a:solidFill>
+              </a14:hiddenFill>
+            </a:ext>
+          </a:extLst>
+        </p:spPr>
+      </p:pic>
+      <p:sp>
+        <p:nvSpPr>
+          <p:cNvPr id="4" name="Obdĺžnik 3">
+            <a:extLst>
+              <a:ext uri="{FF2B5EF4-FFF2-40B4-BE49-F238E27FC236}">
+                <a16:creationId xmlns:a16="http://schemas.microsoft.com/office/drawing/2014/main" id="{B3BABD09-FCCC-754E-313E-77CA7247E9F5}"/>
+              </a:ext>
+            </a:extLst>
+          </p:cNvPr>
+          <p:cNvSpPr/>
+          <p:nvPr/>
+        </p:nvSpPr>
+        <p:spPr>
+          <a:xfrm>
+            <a:off x="696000" y="960025"/>
+            <a:ext cx="10800000" cy="1080000"/>
+          </a:xfrm>
+          <a:prstGeom prst="rect">
+            <a:avLst/>
+          </a:prstGeom>
+        </p:spPr>
+        <p:style>
+          <a:lnRef idx="2">
+            <a:schemeClr val="accent1">
+              <a:shade val="15000"/>
+            </a:schemeClr>
+          </a:lnRef>
+          <a:fillRef idx="1">
+            <a:schemeClr val="accent1"/>
+          </a:fillRef>
+          <a:effectRef idx="0">
+            <a:schemeClr val="accent1"/>
+          </a:effectRef>
+          <a:fontRef idx="minor">
+            <a:schemeClr val="lt1"/>
+          </a:fontRef>
+        </p:style>
+        <p:txBody>
+          <a:bodyPr rtlCol="0" anchor="ctr"/>
+          <a:lstStyle/>
+          <a:p>
+            <a:pPr algn="ctr"/>
+            <a:endParaRPr lang="sk-SK" dirty="0"/>
+          </a:p>
+        </p:txBody>
+      </p:sp>
+      <p:sp>
+        <p:nvSpPr>
+          <p:cNvPr id="2" name="Nadpis 1">
+            <a:extLst>
+              <a:ext uri="{FF2B5EF4-FFF2-40B4-BE49-F238E27FC236}">
+                <a16:creationId xmlns:a16="http://schemas.microsoft.com/office/drawing/2014/main" id="{70F113B0-C010-A2A4-9883-B1FDF8A1C7C4}"/>
+              </a:ext>
+            </a:extLst>
+          </p:cNvPr>
+          <p:cNvSpPr>
+            <a:spLocks noGrp="1"/>
+          </p:cNvSpPr>
+          <p:nvPr>
+            <p:ph type="title"/>
+          </p:nvPr>
+        </p:nvSpPr>
+        <p:spPr>
+          <a:xfrm>
+            <a:off x="801664" y="1126050"/>
+            <a:ext cx="10435296" cy="716147"/>
+          </a:xfrm>
+        </p:spPr>
+        <p:txBody>
+          <a:bodyPr>
+            <a:normAutofit/>
+          </a:bodyPr>
+          <a:lstStyle/>
+          <a:p>
+            <a:pPr algn="ctr"/>
+            <a:r>
+              <a:rPr lang="sk-SK" sz="3500" b="1" dirty="0"/>
+              <a:t>Ďakujem za pozornosť!</a:t>
+            </a:r>
+          </a:p>
+        </p:txBody>
+      </p:sp>
+      <p:sp>
+        <p:nvSpPr>
+          <p:cNvPr id="5" name="Obdĺžnik 4">
+            <a:extLst>
+              <a:ext uri="{FF2B5EF4-FFF2-40B4-BE49-F238E27FC236}">
+                <a16:creationId xmlns:a16="http://schemas.microsoft.com/office/drawing/2014/main" id="{F3088E56-0899-B53B-3C9F-493355F4E19D}"/>
+              </a:ext>
+            </a:extLst>
+          </p:cNvPr>
+          <p:cNvSpPr/>
+          <p:nvPr/>
+        </p:nvSpPr>
+        <p:spPr>
+          <a:xfrm>
+            <a:off x="696000" y="792172"/>
+            <a:ext cx="3240000" cy="90000"/>
+          </a:xfrm>
+          <a:prstGeom prst="rect">
+            <a:avLst/>
+          </a:prstGeom>
+        </p:spPr>
+        <p:style>
+          <a:lnRef idx="2">
+            <a:schemeClr val="accent1">
+              <a:shade val="15000"/>
+            </a:schemeClr>
+          </a:lnRef>
+          <a:fillRef idx="1">
+            <a:schemeClr val="accent1"/>
+          </a:fillRef>
+          <a:effectRef idx="0">
+            <a:schemeClr val="accent1"/>
+          </a:effectRef>
+          <a:fontRef idx="minor">
+            <a:schemeClr val="lt1"/>
+          </a:fontRef>
+        </p:style>
+        <p:txBody>
+          <a:bodyPr rtlCol="0" anchor="ctr"/>
+          <a:lstStyle/>
+          <a:p>
+            <a:pPr algn="ctr"/>
+            <a:endParaRPr lang="sk-SK"/>
+          </a:p>
+        </p:txBody>
+      </p:sp>
+      <p:sp>
+        <p:nvSpPr>
+          <p:cNvPr id="6" name="Obdĺžnik 5">
+            <a:extLst>
+              <a:ext uri="{FF2B5EF4-FFF2-40B4-BE49-F238E27FC236}">
+                <a16:creationId xmlns:a16="http://schemas.microsoft.com/office/drawing/2014/main" id="{5F18FA96-1ED6-DE70-9C23-342E375182DF}"/>
+              </a:ext>
+            </a:extLst>
+          </p:cNvPr>
+          <p:cNvSpPr/>
+          <p:nvPr/>
+        </p:nvSpPr>
+        <p:spPr>
+          <a:xfrm>
+            <a:off x="4476000" y="792172"/>
+            <a:ext cx="3240000" cy="90000"/>
+          </a:xfrm>
+          <a:prstGeom prst="rect">
+            <a:avLst/>
+          </a:prstGeom>
+          <a:solidFill>
+            <a:srgbClr val="00B0F0"/>
+          </a:solidFill>
+        </p:spPr>
+        <p:style>
+          <a:lnRef idx="2">
+            <a:schemeClr val="accent1">
+              <a:shade val="15000"/>
+            </a:schemeClr>
+          </a:lnRef>
+          <a:fillRef idx="1">
+            <a:schemeClr val="accent1"/>
+          </a:fillRef>
+          <a:effectRef idx="0">
+            <a:schemeClr val="accent1"/>
+          </a:effectRef>
+          <a:fontRef idx="minor">
+            <a:schemeClr val="lt1"/>
+          </a:fontRef>
+        </p:style>
+        <p:txBody>
+          <a:bodyPr rtlCol="0" anchor="ctr"/>
+          <a:lstStyle/>
+          <a:p>
+            <a:pPr algn="ctr"/>
+            <a:endParaRPr lang="sk-SK"/>
+          </a:p>
+        </p:txBody>
+      </p:sp>
+      <p:sp>
+        <p:nvSpPr>
+          <p:cNvPr id="7" name="Obdĺžnik 6">
+            <a:extLst>
+              <a:ext uri="{FF2B5EF4-FFF2-40B4-BE49-F238E27FC236}">
+                <a16:creationId xmlns:a16="http://schemas.microsoft.com/office/drawing/2014/main" id="{E698FE54-1F4A-D253-7910-14B6572B87A3}"/>
+              </a:ext>
+            </a:extLst>
+          </p:cNvPr>
+          <p:cNvSpPr/>
+          <p:nvPr/>
+        </p:nvSpPr>
+        <p:spPr>
+          <a:xfrm>
+            <a:off x="8256000" y="792172"/>
+            <a:ext cx="3240000" cy="90000"/>
+          </a:xfrm>
+          <a:prstGeom prst="rect">
+            <a:avLst/>
+          </a:prstGeom>
+          <a:solidFill>
+            <a:schemeClr val="accent4">
+              <a:lumMod val="60000"/>
+              <a:lumOff val="40000"/>
+            </a:schemeClr>
+          </a:solidFill>
+        </p:spPr>
+        <p:style>
+          <a:lnRef idx="2">
+            <a:schemeClr val="accent1">
+              <a:shade val="15000"/>
+            </a:schemeClr>
+          </a:lnRef>
+          <a:fillRef idx="1">
+            <a:schemeClr val="accent1"/>
+          </a:fillRef>
+          <a:effectRef idx="0">
+            <a:schemeClr val="accent1"/>
+          </a:effectRef>
+          <a:fontRef idx="minor">
+            <a:schemeClr val="lt1"/>
+          </a:fontRef>
+        </p:style>
+        <p:txBody>
+          <a:bodyPr rtlCol="0" anchor="ctr"/>
+          <a:lstStyle/>
+          <a:p>
+            <a:pPr algn="ctr"/>
+            <a:endParaRPr lang="sk-SK"/>
+          </a:p>
+        </p:txBody>
+      </p:sp>
+      <p:sp>
+        <p:nvSpPr>
+          <p:cNvPr id="8" name="Pravouhlý trojuholník 7">
+            <a:extLst>
+              <a:ext uri="{FF2B5EF4-FFF2-40B4-BE49-F238E27FC236}">
+                <a16:creationId xmlns:a16="http://schemas.microsoft.com/office/drawing/2014/main" id="{10349A59-CBAC-6727-483C-8EE134813A9D}"/>
+              </a:ext>
+            </a:extLst>
+          </p:cNvPr>
+          <p:cNvSpPr/>
+          <p:nvPr/>
+        </p:nvSpPr>
+        <p:spPr>
+          <a:xfrm rot="16200000">
+            <a:off x="10581600" y="1125625"/>
+            <a:ext cx="914400" cy="914400"/>
+          </a:xfrm>
+          <a:prstGeom prst="rtTriangle">
+            <a:avLst/>
+          </a:prstGeom>
+          <a:solidFill>
+            <a:schemeClr val="accent4">
+              <a:lumMod val="75000"/>
+            </a:schemeClr>
+          </a:solidFill>
+        </p:spPr>
+        <p:style>
+          <a:lnRef idx="2">
+            <a:schemeClr val="accent1">
+              <a:shade val="15000"/>
+            </a:schemeClr>
+          </a:lnRef>
+          <a:fillRef idx="1">
+            <a:schemeClr val="accent1"/>
+          </a:fillRef>
+          <a:effectRef idx="0">
+            <a:schemeClr val="accent1"/>
+          </a:effectRef>
+          <a:fontRef idx="minor">
+            <a:schemeClr val="lt1"/>
+          </a:fontRef>
+        </p:style>
+        <p:txBody>
+          <a:bodyPr rtlCol="0" anchor="ctr"/>
+          <a:lstStyle/>
+          <a:p>
+            <a:pPr algn="ctr"/>
+            <a:endParaRPr lang="sk-SK"/>
+          </a:p>
+        </p:txBody>
+      </p:sp>
+      <p:sp>
+        <p:nvSpPr>
+          <p:cNvPr id="9" name="Pravouhlý trojuholník 8">
+            <a:extLst>
+              <a:ext uri="{FF2B5EF4-FFF2-40B4-BE49-F238E27FC236}">
+                <a16:creationId xmlns:a16="http://schemas.microsoft.com/office/drawing/2014/main" id="{13D2CD55-1330-01B7-A762-727524B75F4B}"/>
+              </a:ext>
+            </a:extLst>
+          </p:cNvPr>
+          <p:cNvSpPr/>
+          <p:nvPr/>
+        </p:nvSpPr>
+        <p:spPr>
+          <a:xfrm rot="5400000">
+            <a:off x="715344" y="960025"/>
+            <a:ext cx="914400" cy="914400"/>
+          </a:xfrm>
+          <a:prstGeom prst="rtTriangle">
+            <a:avLst/>
+          </a:prstGeom>
+          <a:solidFill>
+            <a:srgbClr val="6C7781">
+              <a:alpha val="30196"/>
+            </a:srgbClr>
+          </a:solidFill>
+        </p:spPr>
+        <p:style>
+          <a:lnRef idx="2">
+            <a:schemeClr val="accent1">
+              <a:shade val="15000"/>
+            </a:schemeClr>
+          </a:lnRef>
+          <a:fillRef idx="1">
+            <a:schemeClr val="accent1"/>
+          </a:fillRef>
+          <a:effectRef idx="0">
+            <a:schemeClr val="accent1"/>
+          </a:effectRef>
+          <a:fontRef idx="minor">
+            <a:schemeClr val="lt1"/>
+          </a:fontRef>
+        </p:style>
+        <p:txBody>
+          <a:bodyPr rtlCol="0" anchor="ctr"/>
+          <a:lstStyle/>
+          <a:p>
+            <a:pPr algn="ctr"/>
+            <a:endParaRPr lang="sk-SK" dirty="0"/>
+          </a:p>
+        </p:txBody>
+      </p:sp>
+    </p:spTree>
+    <p:extLst>
+      <p:ext uri="{BB962C8B-B14F-4D97-AF65-F5344CB8AC3E}">
+        <p14:creationId xmlns:p14="http://schemas.microsoft.com/office/powerpoint/2010/main" val="1950755834"/>
+      </p:ext>
+    </p:extLst>
+  </p:cSld>
+  <p:clrMapOvr>
+    <a:masterClrMapping/>
+  </p:clrMapOvr>
+</p:sld>
+</file>
+
 <file path=ppt/slides/slide2.xml><?xml version="1.0" encoding="utf-8"?>
 <p:sld xmlns:a="http://schemas.openxmlformats.org/drawingml/2006/main" xmlns:r="http://schemas.openxmlformats.org/officeDocument/2006/relationships" xmlns:p="http://schemas.openxmlformats.org/presentationml/2006/main">
   <p:cSld>
@@ -10928,7 +11335,7 @@
         <p:spPr>
           <a:xfrm>
             <a:off x="711200" y="2796000"/>
-            <a:ext cx="4346190" cy="2477601"/>
+            <a:ext cx="2852127" cy="2477601"/>
           </a:xfrm>
           <a:prstGeom prst="rect">
             <a:avLst/>
@@ -10977,7 +11384,7 @@
                   <a:schemeClr val="bg1"/>
                 </a:solidFill>
               </a:rPr>
-              <a:t>Streamovanie videa alebo hudby</a:t>
+              <a:t>Kvalita streamovania</a:t>
             </a:r>
           </a:p>
           <a:p>
@@ -11060,7 +11467,7 @@
         <p:spPr>
           <a:xfrm>
             <a:off x="6482080" y="2764349"/>
-            <a:ext cx="1838965" cy="1985159"/>
+            <a:ext cx="3147015" cy="2369880"/>
           </a:xfrm>
           <a:prstGeom prst="rect">
             <a:avLst/>
@@ -11118,6 +11525,16 @@
                 </a:solidFill>
               </a:rPr>
               <a:t>Čas výstavby</a:t>
+            </a:r>
+          </a:p>
+          <a:p>
+            <a:r>
+              <a:rPr lang="sk-SK" sz="2500" dirty="0">
+                <a:solidFill>
+                  <a:schemeClr val="bg1"/>
+                </a:solidFill>
+              </a:rPr>
+              <a:t>vyššia spotreba batérie</a:t>
             </a:r>
           </a:p>
           <a:p>
@@ -11309,6 +11726,554 @@
           <p:cNvPr id="2" name="Nadpis 1">
             <a:extLst>
               <a:ext uri="{FF2B5EF4-FFF2-40B4-BE49-F238E27FC236}">
+                <a16:creationId xmlns:a16="http://schemas.microsoft.com/office/drawing/2014/main" id="{B614B4E7-FB79-E8CC-CD89-2FFEDE58504C}"/>
+              </a:ext>
+            </a:extLst>
+          </p:cNvPr>
+          <p:cNvSpPr>
+            <a:spLocks noGrp="1"/>
+          </p:cNvSpPr>
+          <p:nvPr>
+            <p:ph type="title"/>
+          </p:nvPr>
+        </p:nvSpPr>
+        <p:spPr/>
+        <p:txBody>
+          <a:bodyPr>
+            <a:normAutofit/>
+          </a:bodyPr>
+          <a:lstStyle/>
+          <a:p>
+            <a:r>
+              <a:rPr lang="sk-SK" sz="3500" b="1" dirty="0">
+                <a:effectLst/>
+                <a:latin typeface="Calibri" panose="020F0502020204030204" pitchFamily="34" charset="0"/>
+                <a:ea typeface="Calibri" panose="020F0502020204030204" pitchFamily="34" charset="0"/>
+                <a:cs typeface="Times New Roman" panose="02020603050405020304" pitchFamily="18" charset="0"/>
+              </a:rPr>
+              <a:t>Porovnanie s predošlými generáciami sieti</a:t>
+            </a:r>
+            <a:endParaRPr lang="sk-SK" sz="3500" b="1" dirty="0"/>
+          </a:p>
+        </p:txBody>
+      </p:sp>
+      <p:graphicFrame>
+        <p:nvGraphicFramePr>
+          <p:cNvPr id="6" name="Zástupný objekt pre obsah 5">
+            <a:extLst>
+              <a:ext uri="{FF2B5EF4-FFF2-40B4-BE49-F238E27FC236}">
+                <a16:creationId xmlns:a16="http://schemas.microsoft.com/office/drawing/2014/main" id="{29EB6F9E-C264-24EF-D905-795D8223733E}"/>
+              </a:ext>
+            </a:extLst>
+          </p:cNvPr>
+          <p:cNvGraphicFramePr>
+            <a:graphicFrameLocks noGrp="1"/>
+          </p:cNvGraphicFramePr>
+          <p:nvPr>
+            <p:ph idx="1"/>
+            <p:extLst>
+              <p:ext uri="{D42A27DB-BD31-4B8C-83A1-F6EECF244321}">
+                <p14:modId xmlns:p14="http://schemas.microsoft.com/office/powerpoint/2010/main" val="1829034352"/>
+              </p:ext>
+            </p:extLst>
+          </p:nvPr>
+        </p:nvGraphicFramePr>
+        <p:xfrm>
+          <a:off x="581025" y="2181224"/>
+          <a:ext cx="11029948" cy="3687732"/>
+        </p:xfrm>
+        <a:graphic>
+          <a:graphicData uri="http://schemas.openxmlformats.org/drawingml/2006/table">
+            <a:tbl>
+              <a:tblPr firstRow="1" bandRow="1">
+                <a:tableStyleId>{5C22544A-7EE6-4342-B048-85BDC9FD1C3A}</a:tableStyleId>
+              </a:tblPr>
+              <a:tblGrid>
+                <a:gridCol w="2880632">
+                  <a:extLst>
+                    <a:ext uri="{9D8B030D-6E8A-4147-A177-3AD203B41FA5}">
+                      <a16:colId xmlns:a16="http://schemas.microsoft.com/office/drawing/2014/main" val="2561380449"/>
+                    </a:ext>
+                  </a:extLst>
+                </a:gridCol>
+                <a:gridCol w="2634342">
+                  <a:extLst>
+                    <a:ext uri="{9D8B030D-6E8A-4147-A177-3AD203B41FA5}">
+                      <a16:colId xmlns:a16="http://schemas.microsoft.com/office/drawing/2014/main" val="4006678700"/>
+                    </a:ext>
+                  </a:extLst>
+                </a:gridCol>
+                <a:gridCol w="2757487">
+                  <a:extLst>
+                    <a:ext uri="{9D8B030D-6E8A-4147-A177-3AD203B41FA5}">
+                      <a16:colId xmlns:a16="http://schemas.microsoft.com/office/drawing/2014/main" val="2601583129"/>
+                    </a:ext>
+                  </a:extLst>
+                </a:gridCol>
+                <a:gridCol w="2757487">
+                  <a:extLst>
+                    <a:ext uri="{9D8B030D-6E8A-4147-A177-3AD203B41FA5}">
+                      <a16:colId xmlns:a16="http://schemas.microsoft.com/office/drawing/2014/main" val="3541135555"/>
+                    </a:ext>
+                  </a:extLst>
+                </a:gridCol>
+              </a:tblGrid>
+              <a:tr h="614622">
+                <a:tc>
+                  <a:txBody>
+                    <a:bodyPr/>
+                    <a:lstStyle/>
+                    <a:p>
+                      <a:r>
+                        <a:rPr lang="sk-SK" dirty="0"/>
+                        <a:t>Generácia mobilnej siete</a:t>
+                      </a:r>
+                    </a:p>
+                  </a:txBody>
+                  <a:tcPr/>
+                </a:tc>
+                <a:tc>
+                  <a:txBody>
+                    <a:bodyPr/>
+                    <a:lstStyle/>
+                    <a:p>
+                      <a:r>
+                        <a:rPr lang="sk-SK" dirty="0"/>
+                        <a:t>Rýchlosť prenosu dát</a:t>
+                      </a:r>
+                    </a:p>
+                  </a:txBody>
+                  <a:tcPr/>
+                </a:tc>
+                <a:tc>
+                  <a:txBody>
+                    <a:bodyPr/>
+                    <a:lstStyle/>
+                    <a:p>
+                      <a:r>
+                        <a:rPr lang="sk-SK" dirty="0"/>
+                        <a:t>Oneskorenie (Latencia)</a:t>
+                      </a:r>
+                    </a:p>
+                  </a:txBody>
+                  <a:tcPr/>
+                </a:tc>
+                <a:tc>
+                  <a:txBody>
+                    <a:bodyPr/>
+                    <a:lstStyle/>
+                    <a:p>
+                      <a:r>
+                        <a:rPr lang="sk-SK" dirty="0"/>
+                        <a:t>Rok</a:t>
+                      </a:r>
+                    </a:p>
+                  </a:txBody>
+                  <a:tcPr/>
+                </a:tc>
+                <a:extLst>
+                  <a:ext uri="{0D108BD9-81ED-4DB2-BD59-A6C34878D82A}">
+                    <a16:rowId xmlns:a16="http://schemas.microsoft.com/office/drawing/2014/main" val="2498370309"/>
+                  </a:ext>
+                </a:extLst>
+              </a:tr>
+              <a:tr h="614622">
+                <a:tc>
+                  <a:txBody>
+                    <a:bodyPr/>
+                    <a:lstStyle/>
+                    <a:p>
+                      <a:r>
+                        <a:rPr lang="sk-SK" dirty="0"/>
+                        <a:t>1G</a:t>
+                      </a:r>
+                    </a:p>
+                  </a:txBody>
+                  <a:tcPr/>
+                </a:tc>
+                <a:tc>
+                  <a:txBody>
+                    <a:bodyPr/>
+                    <a:lstStyle/>
+                    <a:p>
+                      <a:r>
+                        <a:rPr lang="sk-SK" dirty="0"/>
+                        <a:t>2,4 </a:t>
+                      </a:r>
+                      <a:r>
+                        <a:rPr lang="sk-SK" dirty="0" err="1"/>
+                        <a:t>kb</a:t>
+                      </a:r>
+                      <a:r>
+                        <a:rPr lang="sk-SK" dirty="0"/>
+                        <a:t>/s</a:t>
+                      </a:r>
+                    </a:p>
+                  </a:txBody>
+                  <a:tcPr/>
+                </a:tc>
+                <a:tc>
+                  <a:txBody>
+                    <a:bodyPr/>
+                    <a:lstStyle/>
+                    <a:p>
+                      <a:r>
+                        <a:rPr lang="sk-SK" dirty="0"/>
+                        <a:t>nedostupné</a:t>
+                      </a:r>
+                    </a:p>
+                  </a:txBody>
+                  <a:tcPr/>
+                </a:tc>
+                <a:tc>
+                  <a:txBody>
+                    <a:bodyPr/>
+                    <a:lstStyle/>
+                    <a:p>
+                      <a:r>
+                        <a:rPr lang="sk-SK" dirty="0"/>
+                        <a:t>1982</a:t>
+                      </a:r>
+                    </a:p>
+                  </a:txBody>
+                  <a:tcPr/>
+                </a:tc>
+                <a:extLst>
+                  <a:ext uri="{0D108BD9-81ED-4DB2-BD59-A6C34878D82A}">
+                    <a16:rowId xmlns:a16="http://schemas.microsoft.com/office/drawing/2014/main" val="1592172554"/>
+                  </a:ext>
+                </a:extLst>
+              </a:tr>
+              <a:tr h="614622">
+                <a:tc>
+                  <a:txBody>
+                    <a:bodyPr/>
+                    <a:lstStyle/>
+                    <a:p>
+                      <a:r>
+                        <a:rPr lang="sk-SK" dirty="0"/>
+                        <a:t>2G</a:t>
+                      </a:r>
+                    </a:p>
+                  </a:txBody>
+                  <a:tcPr/>
+                </a:tc>
+                <a:tc>
+                  <a:txBody>
+                    <a:bodyPr/>
+                    <a:lstStyle/>
+                    <a:p>
+                      <a:r>
+                        <a:rPr lang="sk-SK" dirty="0"/>
+                        <a:t>6,4 </a:t>
+                      </a:r>
+                      <a:r>
+                        <a:rPr lang="sk-SK" dirty="0" err="1"/>
+                        <a:t>kb</a:t>
+                      </a:r>
+                      <a:r>
+                        <a:rPr lang="sk-SK" dirty="0"/>
+                        <a:t>/s</a:t>
+                      </a:r>
+                    </a:p>
+                  </a:txBody>
+                  <a:tcPr/>
+                </a:tc>
+                <a:tc>
+                  <a:txBody>
+                    <a:bodyPr/>
+                    <a:lstStyle/>
+                    <a:p>
+                      <a:r>
+                        <a:rPr lang="sk-SK" dirty="0"/>
+                        <a:t>300-1000 MS</a:t>
+                      </a:r>
+                    </a:p>
+                  </a:txBody>
+                  <a:tcPr/>
+                </a:tc>
+                <a:tc>
+                  <a:txBody>
+                    <a:bodyPr/>
+                    <a:lstStyle/>
+                    <a:p>
+                      <a:r>
+                        <a:rPr lang="sk-SK" dirty="0"/>
+                        <a:t>1992</a:t>
+                      </a:r>
+                    </a:p>
+                  </a:txBody>
+                  <a:tcPr/>
+                </a:tc>
+                <a:extLst>
+                  <a:ext uri="{0D108BD9-81ED-4DB2-BD59-A6C34878D82A}">
+                    <a16:rowId xmlns:a16="http://schemas.microsoft.com/office/drawing/2014/main" val="290259874"/>
+                  </a:ext>
+                </a:extLst>
+              </a:tr>
+              <a:tr h="614622">
+                <a:tc>
+                  <a:txBody>
+                    <a:bodyPr/>
+                    <a:lstStyle/>
+                    <a:p>
+                      <a:r>
+                        <a:rPr lang="sk-SK" dirty="0"/>
+                        <a:t>3G</a:t>
+                      </a:r>
+                    </a:p>
+                  </a:txBody>
+                  <a:tcPr/>
+                </a:tc>
+                <a:tc>
+                  <a:txBody>
+                    <a:bodyPr/>
+                    <a:lstStyle/>
+                    <a:p>
+                      <a:r>
+                        <a:rPr lang="sk-SK" dirty="0"/>
+                        <a:t>2 Mb/s</a:t>
+                      </a:r>
+                    </a:p>
+                  </a:txBody>
+                  <a:tcPr/>
+                </a:tc>
+                <a:tc>
+                  <a:txBody>
+                    <a:bodyPr/>
+                    <a:lstStyle/>
+                    <a:p>
+                      <a:r>
+                        <a:rPr lang="sk-SK" dirty="0"/>
+                        <a:t>100-500 MS</a:t>
+                      </a:r>
+                    </a:p>
+                  </a:txBody>
+                  <a:tcPr/>
+                </a:tc>
+                <a:tc>
+                  <a:txBody>
+                    <a:bodyPr/>
+                    <a:lstStyle/>
+                    <a:p>
+                      <a:r>
+                        <a:rPr lang="sk-SK" dirty="0"/>
+                        <a:t>1998</a:t>
+                      </a:r>
+                    </a:p>
+                  </a:txBody>
+                  <a:tcPr/>
+                </a:tc>
+                <a:extLst>
+                  <a:ext uri="{0D108BD9-81ED-4DB2-BD59-A6C34878D82A}">
+                    <a16:rowId xmlns:a16="http://schemas.microsoft.com/office/drawing/2014/main" val="3532303420"/>
+                  </a:ext>
+                </a:extLst>
+              </a:tr>
+              <a:tr h="614622">
+                <a:tc>
+                  <a:txBody>
+                    <a:bodyPr/>
+                    <a:lstStyle/>
+                    <a:p>
+                      <a:r>
+                        <a:rPr lang="sk-SK" dirty="0"/>
+                        <a:t>4G</a:t>
+                      </a:r>
+                    </a:p>
+                  </a:txBody>
+                  <a:tcPr/>
+                </a:tc>
+                <a:tc>
+                  <a:txBody>
+                    <a:bodyPr/>
+                    <a:lstStyle/>
+                    <a:p>
+                      <a:r>
+                        <a:rPr lang="sk-SK" dirty="0"/>
+                        <a:t>100 Mb/s</a:t>
+                      </a:r>
+                    </a:p>
+                  </a:txBody>
+                  <a:tcPr/>
+                </a:tc>
+                <a:tc>
+                  <a:txBody>
+                    <a:bodyPr/>
+                    <a:lstStyle/>
+                    <a:p>
+                      <a:r>
+                        <a:rPr lang="sk-SK" dirty="0"/>
+                        <a:t>&lt; 100 MS</a:t>
+                      </a:r>
+                    </a:p>
+                  </a:txBody>
+                  <a:tcPr/>
+                </a:tc>
+                <a:tc>
+                  <a:txBody>
+                    <a:bodyPr/>
+                    <a:lstStyle/>
+                    <a:p>
+                      <a:r>
+                        <a:rPr lang="sk-SK" dirty="0"/>
+                        <a:t>2011</a:t>
+                      </a:r>
+                    </a:p>
+                  </a:txBody>
+                  <a:tcPr/>
+                </a:tc>
+                <a:extLst>
+                  <a:ext uri="{0D108BD9-81ED-4DB2-BD59-A6C34878D82A}">
+                    <a16:rowId xmlns:a16="http://schemas.microsoft.com/office/drawing/2014/main" val="1948414480"/>
+                  </a:ext>
+                </a:extLst>
+              </a:tr>
+              <a:tr h="614622">
+                <a:tc>
+                  <a:txBody>
+                    <a:bodyPr/>
+                    <a:lstStyle/>
+                    <a:p>
+                      <a:r>
+                        <a:rPr lang="sk-SK" dirty="0"/>
+                        <a:t>5G</a:t>
+                      </a:r>
+                    </a:p>
+                  </a:txBody>
+                  <a:tcPr/>
+                </a:tc>
+                <a:tc>
+                  <a:txBody>
+                    <a:bodyPr/>
+                    <a:lstStyle/>
+                    <a:p>
+                      <a:r>
+                        <a:rPr lang="sk-SK" dirty="0"/>
+                        <a:t>20 Gb/s</a:t>
+                      </a:r>
+                    </a:p>
+                  </a:txBody>
+                  <a:tcPr/>
+                </a:tc>
+                <a:tc>
+                  <a:txBody>
+                    <a:bodyPr/>
+                    <a:lstStyle/>
+                    <a:p>
+                      <a:r>
+                        <a:rPr lang="sk-SK" dirty="0"/>
+                        <a:t>&lt; 5 MS</a:t>
+                      </a:r>
+                    </a:p>
+                  </a:txBody>
+                  <a:tcPr/>
+                </a:tc>
+                <a:tc>
+                  <a:txBody>
+                    <a:bodyPr/>
+                    <a:lstStyle/>
+                    <a:p>
+                      <a:r>
+                        <a:rPr lang="sk-SK" dirty="0"/>
+                        <a:t>2020</a:t>
+                      </a:r>
+                    </a:p>
+                  </a:txBody>
+                  <a:tcPr/>
+                </a:tc>
+                <a:extLst>
+                  <a:ext uri="{0D108BD9-81ED-4DB2-BD59-A6C34878D82A}">
+                    <a16:rowId xmlns:a16="http://schemas.microsoft.com/office/drawing/2014/main" val="85075475"/>
+                  </a:ext>
+                </a:extLst>
+              </a:tr>
+            </a:tbl>
+          </a:graphicData>
+        </a:graphic>
+      </p:graphicFrame>
+      <p:sp>
+        <p:nvSpPr>
+          <p:cNvPr id="7" name="BlokTextu 6">
+            <a:extLst>
+              <a:ext uri="{FF2B5EF4-FFF2-40B4-BE49-F238E27FC236}">
+                <a16:creationId xmlns:a16="http://schemas.microsoft.com/office/drawing/2014/main" id="{7BA80B44-6D7B-76D6-C9BC-7166B55F2F3B}"/>
+              </a:ext>
+            </a:extLst>
+          </p:cNvPr>
+          <p:cNvSpPr txBox="1"/>
+          <p:nvPr/>
+        </p:nvSpPr>
+        <p:spPr>
+          <a:xfrm>
+            <a:off x="3396343" y="6155844"/>
+            <a:ext cx="4292081" cy="369332"/>
+          </a:xfrm>
+          <a:prstGeom prst="rect">
+            <a:avLst/>
+          </a:prstGeom>
+          <a:noFill/>
+        </p:spPr>
+        <p:txBody>
+          <a:bodyPr wrap="square" rtlCol="0">
+            <a:spAutoFit/>
+          </a:bodyPr>
+          <a:lstStyle/>
+          <a:p>
+            <a:r>
+              <a:rPr lang="sk-SK" dirty="0" err="1"/>
+              <a:t>Kb</a:t>
+            </a:r>
+            <a:r>
+              <a:rPr lang="sk-SK" dirty="0"/>
+              <a:t>/s = </a:t>
+            </a:r>
+            <a:r>
+              <a:rPr lang="sk-SK" dirty="0" err="1"/>
+              <a:t>Kilobit</a:t>
+            </a:r>
+            <a:r>
+              <a:rPr lang="sk-SK" dirty="0"/>
+              <a:t> za sekundu, MS = milisekundy</a:t>
+            </a:r>
+          </a:p>
+        </p:txBody>
+      </p:sp>
+    </p:spTree>
+    <p:extLst>
+      <p:ext uri="{BB962C8B-B14F-4D97-AF65-F5344CB8AC3E}">
+        <p14:creationId xmlns:p14="http://schemas.microsoft.com/office/powerpoint/2010/main" val="3292566298"/>
+      </p:ext>
+    </p:extLst>
+  </p:cSld>
+  <p:clrMapOvr>
+    <a:masterClrMapping/>
+  </p:clrMapOvr>
+</p:sld>
+</file>
+
+<file path=ppt/slides/slide8.xml><?xml version="1.0" encoding="utf-8"?>
+<p:sld xmlns:a="http://schemas.openxmlformats.org/drawingml/2006/main" xmlns:r="http://schemas.openxmlformats.org/officeDocument/2006/relationships" xmlns:p="http://schemas.openxmlformats.org/presentationml/2006/main">
+  <p:cSld>
+    <p:spTree>
+      <p:nvGrpSpPr>
+        <p:cNvPr id="1" name=""/>
+        <p:cNvGrpSpPr/>
+        <p:nvPr/>
+      </p:nvGrpSpPr>
+      <p:grpSpPr>
+        <a:xfrm>
+          <a:off x="0" y="0"/>
+          <a:ext cx="0" cy="0"/>
+          <a:chOff x="0" y="0"/>
+          <a:chExt cx="0" cy="0"/>
+        </a:xfrm>
+      </p:grpSpPr>
+      <p:sp>
+        <p:nvSpPr>
+          <p:cNvPr id="2" name="Nadpis 1">
+            <a:extLst>
+              <a:ext uri="{FF2B5EF4-FFF2-40B4-BE49-F238E27FC236}">
                 <a16:creationId xmlns:a16="http://schemas.microsoft.com/office/drawing/2014/main" id="{21E36743-27E9-A452-1BCA-05C701C02CE6}"/>
               </a:ext>
             </a:extLst>
@@ -11398,7 +12363,7 @@
 </p:sld>
 </file>
 
-<file path=ppt/slides/slide8.xml><?xml version="1.0" encoding="utf-8"?>
+<file path=ppt/slides/slide9.xml><?xml version="1.0" encoding="utf-8"?>
 <p:sld xmlns:a="http://schemas.openxmlformats.org/drawingml/2006/main" xmlns:r="http://schemas.openxmlformats.org/officeDocument/2006/relationships" xmlns:p="http://schemas.openxmlformats.org/presentationml/2006/main">
   <p:cSld>
     <p:spTree>
@@ -11474,412 +12439,6 @@
     <p:extLst>
       <p:ext uri="{BB962C8B-B14F-4D97-AF65-F5344CB8AC3E}">
         <p14:creationId xmlns:p14="http://schemas.microsoft.com/office/powerpoint/2010/main" val="2466860882"/>
-      </p:ext>
-    </p:extLst>
-  </p:cSld>
-  <p:clrMapOvr>
-    <a:masterClrMapping/>
-  </p:clrMapOvr>
-</p:sld>
-</file>
-
-<file path=ppt/slides/slide9.xml><?xml version="1.0" encoding="utf-8"?>
-<p:sld xmlns:a="http://schemas.openxmlformats.org/drawingml/2006/main" xmlns:r="http://schemas.openxmlformats.org/officeDocument/2006/relationships" xmlns:p="http://schemas.openxmlformats.org/presentationml/2006/main">
-  <p:cSld>
-    <p:spTree>
-      <p:nvGrpSpPr>
-        <p:cNvPr id="1" name=""/>
-        <p:cNvGrpSpPr/>
-        <p:nvPr/>
-      </p:nvGrpSpPr>
-      <p:grpSpPr>
-        <a:xfrm>
-          <a:off x="0" y="0"/>
-          <a:ext cx="0" cy="0"/>
-          <a:chOff x="0" y="0"/>
-          <a:chExt cx="0" cy="0"/>
-        </a:xfrm>
-      </p:grpSpPr>
-      <p:pic>
-        <p:nvPicPr>
-          <p:cNvPr id="5122" name="Picture 2" descr="5G-Technologie: Alles, was es zu wissen gilt">
-            <a:extLst>
-              <a:ext uri="{FF2B5EF4-FFF2-40B4-BE49-F238E27FC236}">
-                <a16:creationId xmlns:a16="http://schemas.microsoft.com/office/drawing/2014/main" id="{5CAD5020-3FC7-5F2A-B8C5-FF0A6E49D881}"/>
-              </a:ext>
-            </a:extLst>
-          </p:cNvPr>
-          <p:cNvPicPr>
-            <a:picLocks noGrp="1" noRot="1" noChangeAspect="1" noMove="1" noResize="1" noEditPoints="1" noAdjustHandles="1" noChangeArrowheads="1" noChangeShapeType="1" noCrop="1"/>
-          </p:cNvPicPr>
-          <p:nvPr/>
-        </p:nvPicPr>
-        <p:blipFill rotWithShape="1">
-          <a:blip r:embed="rId2">
-            <a:extLst>
-              <a:ext uri="{28A0092B-C50C-407E-A947-70E740481C1C}">
-                <a14:useLocalDpi xmlns:a14="http://schemas.microsoft.com/office/drawing/2010/main" val="0"/>
-              </a:ext>
-            </a:extLst>
-          </a:blip>
-          <a:srcRect b="15670"/>
-          <a:stretch/>
-        </p:blipFill>
-        <p:spPr bwMode="auto">
-          <a:xfrm>
-            <a:off x="0" y="0"/>
-            <a:ext cx="12192000" cy="6858000"/>
-          </a:xfrm>
-          <a:prstGeom prst="rect">
-            <a:avLst/>
-          </a:prstGeom>
-          <a:noFill/>
-          <a:extLst>
-            <a:ext uri="{909E8E84-426E-40DD-AFC4-6F175D3DCCD1}">
-              <a14:hiddenFill xmlns:a14="http://schemas.microsoft.com/office/drawing/2010/main">
-                <a:solidFill>
-                  <a:srgbClr val="FFFFFF"/>
-                </a:solidFill>
-              </a14:hiddenFill>
-            </a:ext>
-          </a:extLst>
-        </p:spPr>
-      </p:pic>
-      <p:sp>
-        <p:nvSpPr>
-          <p:cNvPr id="4" name="Obdĺžnik 3">
-            <a:extLst>
-              <a:ext uri="{FF2B5EF4-FFF2-40B4-BE49-F238E27FC236}">
-                <a16:creationId xmlns:a16="http://schemas.microsoft.com/office/drawing/2014/main" id="{B3BABD09-FCCC-754E-313E-77CA7247E9F5}"/>
-              </a:ext>
-            </a:extLst>
-          </p:cNvPr>
-          <p:cNvSpPr/>
-          <p:nvPr/>
-        </p:nvSpPr>
-        <p:spPr>
-          <a:xfrm>
-            <a:off x="696000" y="960025"/>
-            <a:ext cx="10800000" cy="1080000"/>
-          </a:xfrm>
-          <a:prstGeom prst="rect">
-            <a:avLst/>
-          </a:prstGeom>
-        </p:spPr>
-        <p:style>
-          <a:lnRef idx="2">
-            <a:schemeClr val="accent1">
-              <a:shade val="15000"/>
-            </a:schemeClr>
-          </a:lnRef>
-          <a:fillRef idx="1">
-            <a:schemeClr val="accent1"/>
-          </a:fillRef>
-          <a:effectRef idx="0">
-            <a:schemeClr val="accent1"/>
-          </a:effectRef>
-          <a:fontRef idx="minor">
-            <a:schemeClr val="lt1"/>
-          </a:fontRef>
-        </p:style>
-        <p:txBody>
-          <a:bodyPr rtlCol="0" anchor="ctr"/>
-          <a:lstStyle/>
-          <a:p>
-            <a:pPr algn="ctr"/>
-            <a:endParaRPr lang="sk-SK" dirty="0"/>
-          </a:p>
-        </p:txBody>
-      </p:sp>
-      <p:sp>
-        <p:nvSpPr>
-          <p:cNvPr id="2" name="Nadpis 1">
-            <a:extLst>
-              <a:ext uri="{FF2B5EF4-FFF2-40B4-BE49-F238E27FC236}">
-                <a16:creationId xmlns:a16="http://schemas.microsoft.com/office/drawing/2014/main" id="{70F113B0-C010-A2A4-9883-B1FDF8A1C7C4}"/>
-              </a:ext>
-            </a:extLst>
-          </p:cNvPr>
-          <p:cNvSpPr>
-            <a:spLocks noGrp="1"/>
-          </p:cNvSpPr>
-          <p:nvPr>
-            <p:ph type="title"/>
-          </p:nvPr>
-        </p:nvSpPr>
-        <p:spPr>
-          <a:xfrm>
-            <a:off x="801664" y="1126050"/>
-            <a:ext cx="10435296" cy="716147"/>
-          </a:xfrm>
-        </p:spPr>
-        <p:txBody>
-          <a:bodyPr>
-            <a:normAutofit/>
-          </a:bodyPr>
-          <a:lstStyle/>
-          <a:p>
-            <a:pPr algn="ctr"/>
-            <a:r>
-              <a:rPr lang="sk-SK" sz="3500" b="1" dirty="0"/>
-              <a:t>Ďakujem za pozornosť!</a:t>
-            </a:r>
-          </a:p>
-        </p:txBody>
-      </p:sp>
-      <p:sp>
-        <p:nvSpPr>
-          <p:cNvPr id="5" name="Obdĺžnik 4">
-            <a:extLst>
-              <a:ext uri="{FF2B5EF4-FFF2-40B4-BE49-F238E27FC236}">
-                <a16:creationId xmlns:a16="http://schemas.microsoft.com/office/drawing/2014/main" id="{F3088E56-0899-B53B-3C9F-493355F4E19D}"/>
-              </a:ext>
-            </a:extLst>
-          </p:cNvPr>
-          <p:cNvSpPr/>
-          <p:nvPr/>
-        </p:nvSpPr>
-        <p:spPr>
-          <a:xfrm>
-            <a:off x="696000" y="792172"/>
-            <a:ext cx="3240000" cy="90000"/>
-          </a:xfrm>
-          <a:prstGeom prst="rect">
-            <a:avLst/>
-          </a:prstGeom>
-        </p:spPr>
-        <p:style>
-          <a:lnRef idx="2">
-            <a:schemeClr val="accent1">
-              <a:shade val="15000"/>
-            </a:schemeClr>
-          </a:lnRef>
-          <a:fillRef idx="1">
-            <a:schemeClr val="accent1"/>
-          </a:fillRef>
-          <a:effectRef idx="0">
-            <a:schemeClr val="accent1"/>
-          </a:effectRef>
-          <a:fontRef idx="minor">
-            <a:schemeClr val="lt1"/>
-          </a:fontRef>
-        </p:style>
-        <p:txBody>
-          <a:bodyPr rtlCol="0" anchor="ctr"/>
-          <a:lstStyle/>
-          <a:p>
-            <a:pPr algn="ctr"/>
-            <a:endParaRPr lang="sk-SK"/>
-          </a:p>
-        </p:txBody>
-      </p:sp>
-      <p:sp>
-        <p:nvSpPr>
-          <p:cNvPr id="6" name="Obdĺžnik 5">
-            <a:extLst>
-              <a:ext uri="{FF2B5EF4-FFF2-40B4-BE49-F238E27FC236}">
-                <a16:creationId xmlns:a16="http://schemas.microsoft.com/office/drawing/2014/main" id="{5F18FA96-1ED6-DE70-9C23-342E375182DF}"/>
-              </a:ext>
-            </a:extLst>
-          </p:cNvPr>
-          <p:cNvSpPr/>
-          <p:nvPr/>
-        </p:nvSpPr>
-        <p:spPr>
-          <a:xfrm>
-            <a:off x="4476000" y="792172"/>
-            <a:ext cx="3240000" cy="90000"/>
-          </a:xfrm>
-          <a:prstGeom prst="rect">
-            <a:avLst/>
-          </a:prstGeom>
-          <a:solidFill>
-            <a:srgbClr val="00B0F0"/>
-          </a:solidFill>
-        </p:spPr>
-        <p:style>
-          <a:lnRef idx="2">
-            <a:schemeClr val="accent1">
-              <a:shade val="15000"/>
-            </a:schemeClr>
-          </a:lnRef>
-          <a:fillRef idx="1">
-            <a:schemeClr val="accent1"/>
-          </a:fillRef>
-          <a:effectRef idx="0">
-            <a:schemeClr val="accent1"/>
-          </a:effectRef>
-          <a:fontRef idx="minor">
-            <a:schemeClr val="lt1"/>
-          </a:fontRef>
-        </p:style>
-        <p:txBody>
-          <a:bodyPr rtlCol="0" anchor="ctr"/>
-          <a:lstStyle/>
-          <a:p>
-            <a:pPr algn="ctr"/>
-            <a:endParaRPr lang="sk-SK"/>
-          </a:p>
-        </p:txBody>
-      </p:sp>
-      <p:sp>
-        <p:nvSpPr>
-          <p:cNvPr id="7" name="Obdĺžnik 6">
-            <a:extLst>
-              <a:ext uri="{FF2B5EF4-FFF2-40B4-BE49-F238E27FC236}">
-                <a16:creationId xmlns:a16="http://schemas.microsoft.com/office/drawing/2014/main" id="{E698FE54-1F4A-D253-7910-14B6572B87A3}"/>
-              </a:ext>
-            </a:extLst>
-          </p:cNvPr>
-          <p:cNvSpPr/>
-          <p:nvPr/>
-        </p:nvSpPr>
-        <p:spPr>
-          <a:xfrm>
-            <a:off x="8256000" y="792172"/>
-            <a:ext cx="3240000" cy="90000"/>
-          </a:xfrm>
-          <a:prstGeom prst="rect">
-            <a:avLst/>
-          </a:prstGeom>
-          <a:solidFill>
-            <a:schemeClr val="accent4">
-              <a:lumMod val="60000"/>
-              <a:lumOff val="40000"/>
-            </a:schemeClr>
-          </a:solidFill>
-        </p:spPr>
-        <p:style>
-          <a:lnRef idx="2">
-            <a:schemeClr val="accent1">
-              <a:shade val="15000"/>
-            </a:schemeClr>
-          </a:lnRef>
-          <a:fillRef idx="1">
-            <a:schemeClr val="accent1"/>
-          </a:fillRef>
-          <a:effectRef idx="0">
-            <a:schemeClr val="accent1"/>
-          </a:effectRef>
-          <a:fontRef idx="minor">
-            <a:schemeClr val="lt1"/>
-          </a:fontRef>
-        </p:style>
-        <p:txBody>
-          <a:bodyPr rtlCol="0" anchor="ctr"/>
-          <a:lstStyle/>
-          <a:p>
-            <a:pPr algn="ctr"/>
-            <a:endParaRPr lang="sk-SK"/>
-          </a:p>
-        </p:txBody>
-      </p:sp>
-      <p:sp>
-        <p:nvSpPr>
-          <p:cNvPr id="8" name="Pravouhlý trojuholník 7">
-            <a:extLst>
-              <a:ext uri="{FF2B5EF4-FFF2-40B4-BE49-F238E27FC236}">
-                <a16:creationId xmlns:a16="http://schemas.microsoft.com/office/drawing/2014/main" id="{10349A59-CBAC-6727-483C-8EE134813A9D}"/>
-              </a:ext>
-            </a:extLst>
-          </p:cNvPr>
-          <p:cNvSpPr/>
-          <p:nvPr/>
-        </p:nvSpPr>
-        <p:spPr>
-          <a:xfrm rot="16200000">
-            <a:off x="10581600" y="1125625"/>
-            <a:ext cx="914400" cy="914400"/>
-          </a:xfrm>
-          <a:prstGeom prst="rtTriangle">
-            <a:avLst/>
-          </a:prstGeom>
-          <a:solidFill>
-            <a:schemeClr val="accent4">
-              <a:lumMod val="75000"/>
-            </a:schemeClr>
-          </a:solidFill>
-        </p:spPr>
-        <p:style>
-          <a:lnRef idx="2">
-            <a:schemeClr val="accent1">
-              <a:shade val="15000"/>
-            </a:schemeClr>
-          </a:lnRef>
-          <a:fillRef idx="1">
-            <a:schemeClr val="accent1"/>
-          </a:fillRef>
-          <a:effectRef idx="0">
-            <a:schemeClr val="accent1"/>
-          </a:effectRef>
-          <a:fontRef idx="minor">
-            <a:schemeClr val="lt1"/>
-          </a:fontRef>
-        </p:style>
-        <p:txBody>
-          <a:bodyPr rtlCol="0" anchor="ctr"/>
-          <a:lstStyle/>
-          <a:p>
-            <a:pPr algn="ctr"/>
-            <a:endParaRPr lang="sk-SK"/>
-          </a:p>
-        </p:txBody>
-      </p:sp>
-      <p:sp>
-        <p:nvSpPr>
-          <p:cNvPr id="9" name="Pravouhlý trojuholník 8">
-            <a:extLst>
-              <a:ext uri="{FF2B5EF4-FFF2-40B4-BE49-F238E27FC236}">
-                <a16:creationId xmlns:a16="http://schemas.microsoft.com/office/drawing/2014/main" id="{13D2CD55-1330-01B7-A762-727524B75F4B}"/>
-              </a:ext>
-            </a:extLst>
-          </p:cNvPr>
-          <p:cNvSpPr/>
-          <p:nvPr/>
-        </p:nvSpPr>
-        <p:spPr>
-          <a:xfrm rot="5400000">
-            <a:off x="715344" y="960025"/>
-            <a:ext cx="914400" cy="914400"/>
-          </a:xfrm>
-          <a:prstGeom prst="rtTriangle">
-            <a:avLst/>
-          </a:prstGeom>
-          <a:solidFill>
-            <a:srgbClr val="6C7781">
-              <a:alpha val="30196"/>
-            </a:srgbClr>
-          </a:solidFill>
-        </p:spPr>
-        <p:style>
-          <a:lnRef idx="2">
-            <a:schemeClr val="accent1">
-              <a:shade val="15000"/>
-            </a:schemeClr>
-          </a:lnRef>
-          <a:fillRef idx="1">
-            <a:schemeClr val="accent1"/>
-          </a:fillRef>
-          <a:effectRef idx="0">
-            <a:schemeClr val="accent1"/>
-          </a:effectRef>
-          <a:fontRef idx="minor">
-            <a:schemeClr val="lt1"/>
-          </a:fontRef>
-        </p:style>
-        <p:txBody>
-          <a:bodyPr rtlCol="0" anchor="ctr"/>
-          <a:lstStyle/>
-          <a:p>
-            <a:pPr algn="ctr"/>
-            <a:endParaRPr lang="sk-SK" dirty="0"/>
-          </a:p>
-        </p:txBody>
-      </p:sp>
-    </p:spTree>
-    <p:extLst>
-      <p:ext uri="{BB962C8B-B14F-4D97-AF65-F5344CB8AC3E}">
-        <p14:creationId xmlns:p14="http://schemas.microsoft.com/office/powerpoint/2010/main" val="1950755834"/>
       </p:ext>
     </p:extLst>
   </p:cSld>

</xml_diff>